<commit_message>
Made change to the presentation
</commit_message>
<xml_diff>
--- a/Spock presentation.pptx
+++ b/Spock presentation.pptx
@@ -162,7 +162,7 @@
           <p:cNvPr id="2" name="Title 1">
             <a:extLst>
               <a:ext uri="{FF2B5EF4-FFF2-40B4-BE49-F238E27FC236}">
-                <a16:creationId xmlns:a16="http://schemas.microsoft.com/office/drawing/2014/main" id="{9E6C6A0E-624C-4795-B523-76EE2FDD0369}"/>
+                <a16:creationId xmlns:a16="http://schemas.microsoft.com/office/drawing/2014/main" xmlns="" id="{9E6C6A0E-624C-4795-B523-76EE2FDD0369}"/>
               </a:ext>
             </a:extLst>
           </p:cNvPr>
@@ -199,7 +199,7 @@
           <p:cNvPr id="3" name="Subtitle 2">
             <a:extLst>
               <a:ext uri="{FF2B5EF4-FFF2-40B4-BE49-F238E27FC236}">
-                <a16:creationId xmlns:a16="http://schemas.microsoft.com/office/drawing/2014/main" id="{43E5FBB6-DCEE-4772-BE54-BD95DEBAD733}"/>
+                <a16:creationId xmlns:a16="http://schemas.microsoft.com/office/drawing/2014/main" xmlns="" id="{43E5FBB6-DCEE-4772-BE54-BD95DEBAD733}"/>
               </a:ext>
             </a:extLst>
           </p:cNvPr>
@@ -269,7 +269,7 @@
           <p:cNvPr id="4" name="Date Placeholder 3">
             <a:extLst>
               <a:ext uri="{FF2B5EF4-FFF2-40B4-BE49-F238E27FC236}">
-                <a16:creationId xmlns:a16="http://schemas.microsoft.com/office/drawing/2014/main" id="{816900BD-A64A-46FC-BDB9-86B4073626EC}"/>
+                <a16:creationId xmlns:a16="http://schemas.microsoft.com/office/drawing/2014/main" xmlns="" id="{816900BD-A64A-46FC-BDB9-86B4073626EC}"/>
               </a:ext>
             </a:extLst>
           </p:cNvPr>
@@ -287,7 +287,7 @@
           <a:p>
             <a:fld id="{1A0AA01A-E3F7-4A63-8F04-B61B41C2BAC6}" type="datetimeFigureOut">
               <a:rPr lang="en-US" smtClean="0"/>
-              <a:t>7/17/2018</a:t>
+              <a:t>7/17/18</a:t>
             </a:fld>
             <a:endParaRPr lang="en-US"/>
           </a:p>
@@ -298,7 +298,7 @@
           <p:cNvPr id="5" name="Footer Placeholder 4">
             <a:extLst>
               <a:ext uri="{FF2B5EF4-FFF2-40B4-BE49-F238E27FC236}">
-                <a16:creationId xmlns:a16="http://schemas.microsoft.com/office/drawing/2014/main" id="{33D221C5-D490-431B-845F-7196C4D7170C}"/>
+                <a16:creationId xmlns:a16="http://schemas.microsoft.com/office/drawing/2014/main" xmlns="" id="{33D221C5-D490-431B-845F-7196C4D7170C}"/>
               </a:ext>
             </a:extLst>
           </p:cNvPr>
@@ -323,7 +323,7 @@
           <p:cNvPr id="6" name="Slide Number Placeholder 5">
             <a:extLst>
               <a:ext uri="{FF2B5EF4-FFF2-40B4-BE49-F238E27FC236}">
-                <a16:creationId xmlns:a16="http://schemas.microsoft.com/office/drawing/2014/main" id="{CEDF25DC-E38C-4E6D-BE38-7887B3DDE28E}"/>
+                <a16:creationId xmlns:a16="http://schemas.microsoft.com/office/drawing/2014/main" xmlns="" id="{CEDF25DC-E38C-4E6D-BE38-7887B3DDE28E}"/>
               </a:ext>
             </a:extLst>
           </p:cNvPr>
@@ -382,7 +382,7 @@
           <p:cNvPr id="2" name="Title 1">
             <a:extLst>
               <a:ext uri="{FF2B5EF4-FFF2-40B4-BE49-F238E27FC236}">
-                <a16:creationId xmlns:a16="http://schemas.microsoft.com/office/drawing/2014/main" id="{2B956EB4-FAFF-40F0-8C3A-B5CF08109696}"/>
+                <a16:creationId xmlns:a16="http://schemas.microsoft.com/office/drawing/2014/main" xmlns="" id="{2B956EB4-FAFF-40F0-8C3A-B5CF08109696}"/>
               </a:ext>
             </a:extLst>
           </p:cNvPr>
@@ -410,7 +410,7 @@
           <p:cNvPr id="3" name="Vertical Text Placeholder 2">
             <a:extLst>
               <a:ext uri="{FF2B5EF4-FFF2-40B4-BE49-F238E27FC236}">
-                <a16:creationId xmlns:a16="http://schemas.microsoft.com/office/drawing/2014/main" id="{73FB5FEA-B566-4C4E-94A2-AEF318186483}"/>
+                <a16:creationId xmlns:a16="http://schemas.microsoft.com/office/drawing/2014/main" xmlns="" id="{73FB5FEA-B566-4C4E-94A2-AEF318186483}"/>
               </a:ext>
             </a:extLst>
           </p:cNvPr>
@@ -467,7 +467,7 @@
           <p:cNvPr id="4" name="Date Placeholder 3">
             <a:extLst>
               <a:ext uri="{FF2B5EF4-FFF2-40B4-BE49-F238E27FC236}">
-                <a16:creationId xmlns:a16="http://schemas.microsoft.com/office/drawing/2014/main" id="{D989E645-2290-4413-8D61-BF69C35A78E0}"/>
+                <a16:creationId xmlns:a16="http://schemas.microsoft.com/office/drawing/2014/main" xmlns="" id="{D989E645-2290-4413-8D61-BF69C35A78E0}"/>
               </a:ext>
             </a:extLst>
           </p:cNvPr>
@@ -485,7 +485,7 @@
           <a:p>
             <a:fld id="{1A0AA01A-E3F7-4A63-8F04-B61B41C2BAC6}" type="datetimeFigureOut">
               <a:rPr lang="en-US" smtClean="0"/>
-              <a:t>7/17/2018</a:t>
+              <a:t>7/17/18</a:t>
             </a:fld>
             <a:endParaRPr lang="en-US"/>
           </a:p>
@@ -496,7 +496,7 @@
           <p:cNvPr id="5" name="Footer Placeholder 4">
             <a:extLst>
               <a:ext uri="{FF2B5EF4-FFF2-40B4-BE49-F238E27FC236}">
-                <a16:creationId xmlns:a16="http://schemas.microsoft.com/office/drawing/2014/main" id="{02055759-3422-4681-903B-8E5391B90BB4}"/>
+                <a16:creationId xmlns:a16="http://schemas.microsoft.com/office/drawing/2014/main" xmlns="" id="{02055759-3422-4681-903B-8E5391B90BB4}"/>
               </a:ext>
             </a:extLst>
           </p:cNvPr>
@@ -521,7 +521,7 @@
           <p:cNvPr id="6" name="Slide Number Placeholder 5">
             <a:extLst>
               <a:ext uri="{FF2B5EF4-FFF2-40B4-BE49-F238E27FC236}">
-                <a16:creationId xmlns:a16="http://schemas.microsoft.com/office/drawing/2014/main" id="{A5B93C32-A9DF-42CD-8F56-FCA988086E68}"/>
+                <a16:creationId xmlns:a16="http://schemas.microsoft.com/office/drawing/2014/main" xmlns="" id="{A5B93C32-A9DF-42CD-8F56-FCA988086E68}"/>
               </a:ext>
             </a:extLst>
           </p:cNvPr>
@@ -580,7 +580,7 @@
           <p:cNvPr id="2" name="Vertical Title 1">
             <a:extLst>
               <a:ext uri="{FF2B5EF4-FFF2-40B4-BE49-F238E27FC236}">
-                <a16:creationId xmlns:a16="http://schemas.microsoft.com/office/drawing/2014/main" id="{CF41C784-4F04-43CF-85EF-A134C9BC9439}"/>
+                <a16:creationId xmlns:a16="http://schemas.microsoft.com/office/drawing/2014/main" xmlns="" id="{CF41C784-4F04-43CF-85EF-A134C9BC9439}"/>
               </a:ext>
             </a:extLst>
           </p:cNvPr>
@@ -613,7 +613,7 @@
           <p:cNvPr id="3" name="Vertical Text Placeholder 2">
             <a:extLst>
               <a:ext uri="{FF2B5EF4-FFF2-40B4-BE49-F238E27FC236}">
-                <a16:creationId xmlns:a16="http://schemas.microsoft.com/office/drawing/2014/main" id="{7E1F7200-14C5-44FE-BCBB-F7DCE56438CD}"/>
+                <a16:creationId xmlns:a16="http://schemas.microsoft.com/office/drawing/2014/main" xmlns="" id="{7E1F7200-14C5-44FE-BCBB-F7DCE56438CD}"/>
               </a:ext>
             </a:extLst>
           </p:cNvPr>
@@ -675,7 +675,7 @@
           <p:cNvPr id="4" name="Date Placeholder 3">
             <a:extLst>
               <a:ext uri="{FF2B5EF4-FFF2-40B4-BE49-F238E27FC236}">
-                <a16:creationId xmlns:a16="http://schemas.microsoft.com/office/drawing/2014/main" id="{973F3D9B-78ED-4346-BCCB-86EB1FEFF132}"/>
+                <a16:creationId xmlns:a16="http://schemas.microsoft.com/office/drawing/2014/main" xmlns="" id="{973F3D9B-78ED-4346-BCCB-86EB1FEFF132}"/>
               </a:ext>
             </a:extLst>
           </p:cNvPr>
@@ -693,7 +693,7 @@
           <a:p>
             <a:fld id="{1A0AA01A-E3F7-4A63-8F04-B61B41C2BAC6}" type="datetimeFigureOut">
               <a:rPr lang="en-US" smtClean="0"/>
-              <a:t>7/17/2018</a:t>
+              <a:t>7/17/18</a:t>
             </a:fld>
             <a:endParaRPr lang="en-US"/>
           </a:p>
@@ -704,7 +704,7 @@
           <p:cNvPr id="5" name="Footer Placeholder 4">
             <a:extLst>
               <a:ext uri="{FF2B5EF4-FFF2-40B4-BE49-F238E27FC236}">
-                <a16:creationId xmlns:a16="http://schemas.microsoft.com/office/drawing/2014/main" id="{57D03151-8E3B-4F39-9B2F-CA618662EF96}"/>
+                <a16:creationId xmlns:a16="http://schemas.microsoft.com/office/drawing/2014/main" xmlns="" id="{57D03151-8E3B-4F39-9B2F-CA618662EF96}"/>
               </a:ext>
             </a:extLst>
           </p:cNvPr>
@@ -729,7 +729,7 @@
           <p:cNvPr id="6" name="Slide Number Placeholder 5">
             <a:extLst>
               <a:ext uri="{FF2B5EF4-FFF2-40B4-BE49-F238E27FC236}">
-                <a16:creationId xmlns:a16="http://schemas.microsoft.com/office/drawing/2014/main" id="{78BDD024-1DA9-4EA7-87C0-A24FF2FF3135}"/>
+                <a16:creationId xmlns:a16="http://schemas.microsoft.com/office/drawing/2014/main" xmlns="" id="{78BDD024-1DA9-4EA7-87C0-A24FF2FF3135}"/>
               </a:ext>
             </a:extLst>
           </p:cNvPr>
@@ -788,7 +788,7 @@
           <p:cNvPr id="2" name="Title 1">
             <a:extLst>
               <a:ext uri="{FF2B5EF4-FFF2-40B4-BE49-F238E27FC236}">
-                <a16:creationId xmlns:a16="http://schemas.microsoft.com/office/drawing/2014/main" id="{1C48BCDB-037A-403D-8141-ACAE57288EDB}"/>
+                <a16:creationId xmlns:a16="http://schemas.microsoft.com/office/drawing/2014/main" xmlns="" id="{1C48BCDB-037A-403D-8141-ACAE57288EDB}"/>
               </a:ext>
             </a:extLst>
           </p:cNvPr>
@@ -816,7 +816,7 @@
           <p:cNvPr id="3" name="Content Placeholder 2">
             <a:extLst>
               <a:ext uri="{FF2B5EF4-FFF2-40B4-BE49-F238E27FC236}">
-                <a16:creationId xmlns:a16="http://schemas.microsoft.com/office/drawing/2014/main" id="{B870888D-71D4-40BC-BD0B-961DBE6C3046}"/>
+                <a16:creationId xmlns:a16="http://schemas.microsoft.com/office/drawing/2014/main" xmlns="" id="{B870888D-71D4-40BC-BD0B-961DBE6C3046}"/>
               </a:ext>
             </a:extLst>
           </p:cNvPr>
@@ -873,7 +873,7 @@
           <p:cNvPr id="4" name="Date Placeholder 3">
             <a:extLst>
               <a:ext uri="{FF2B5EF4-FFF2-40B4-BE49-F238E27FC236}">
-                <a16:creationId xmlns:a16="http://schemas.microsoft.com/office/drawing/2014/main" id="{FB13F5A3-F794-4797-934C-79C88067A90D}"/>
+                <a16:creationId xmlns:a16="http://schemas.microsoft.com/office/drawing/2014/main" xmlns="" id="{FB13F5A3-F794-4797-934C-79C88067A90D}"/>
               </a:ext>
             </a:extLst>
           </p:cNvPr>
@@ -891,7 +891,7 @@
           <a:p>
             <a:fld id="{1A0AA01A-E3F7-4A63-8F04-B61B41C2BAC6}" type="datetimeFigureOut">
               <a:rPr lang="en-US" smtClean="0"/>
-              <a:t>7/17/2018</a:t>
+              <a:t>7/17/18</a:t>
             </a:fld>
             <a:endParaRPr lang="en-US"/>
           </a:p>
@@ -902,7 +902,7 @@
           <p:cNvPr id="5" name="Footer Placeholder 4">
             <a:extLst>
               <a:ext uri="{FF2B5EF4-FFF2-40B4-BE49-F238E27FC236}">
-                <a16:creationId xmlns:a16="http://schemas.microsoft.com/office/drawing/2014/main" id="{541742B5-D319-4E6B-9540-17D0B8A83A9C}"/>
+                <a16:creationId xmlns:a16="http://schemas.microsoft.com/office/drawing/2014/main" xmlns="" id="{541742B5-D319-4E6B-9540-17D0B8A83A9C}"/>
               </a:ext>
             </a:extLst>
           </p:cNvPr>
@@ -927,7 +927,7 @@
           <p:cNvPr id="6" name="Slide Number Placeholder 5">
             <a:extLst>
               <a:ext uri="{FF2B5EF4-FFF2-40B4-BE49-F238E27FC236}">
-                <a16:creationId xmlns:a16="http://schemas.microsoft.com/office/drawing/2014/main" id="{47D006A7-7E42-4DED-8B94-087E3E4BEFBA}"/>
+                <a16:creationId xmlns:a16="http://schemas.microsoft.com/office/drawing/2014/main" xmlns="" id="{47D006A7-7E42-4DED-8B94-087E3E4BEFBA}"/>
               </a:ext>
             </a:extLst>
           </p:cNvPr>
@@ -986,7 +986,7 @@
           <p:cNvPr id="2" name="Title 1">
             <a:extLst>
               <a:ext uri="{FF2B5EF4-FFF2-40B4-BE49-F238E27FC236}">
-                <a16:creationId xmlns:a16="http://schemas.microsoft.com/office/drawing/2014/main" id="{85F10983-5319-4EB4-92C4-E63B9FF45957}"/>
+                <a16:creationId xmlns:a16="http://schemas.microsoft.com/office/drawing/2014/main" xmlns="" id="{85F10983-5319-4EB4-92C4-E63B9FF45957}"/>
               </a:ext>
             </a:extLst>
           </p:cNvPr>
@@ -1023,7 +1023,7 @@
           <p:cNvPr id="3" name="Text Placeholder 2">
             <a:extLst>
               <a:ext uri="{FF2B5EF4-FFF2-40B4-BE49-F238E27FC236}">
-                <a16:creationId xmlns:a16="http://schemas.microsoft.com/office/drawing/2014/main" id="{53685531-E0F9-4DFA-88A8-1C4AC520622B}"/>
+                <a16:creationId xmlns:a16="http://schemas.microsoft.com/office/drawing/2014/main" xmlns="" id="{53685531-E0F9-4DFA-88A8-1C4AC520622B}"/>
               </a:ext>
             </a:extLst>
           </p:cNvPr>
@@ -1148,7 +1148,7 @@
           <p:cNvPr id="4" name="Date Placeholder 3">
             <a:extLst>
               <a:ext uri="{FF2B5EF4-FFF2-40B4-BE49-F238E27FC236}">
-                <a16:creationId xmlns:a16="http://schemas.microsoft.com/office/drawing/2014/main" id="{3BAB98FA-48F2-44B9-825C-8ABD8C236902}"/>
+                <a16:creationId xmlns:a16="http://schemas.microsoft.com/office/drawing/2014/main" xmlns="" id="{3BAB98FA-48F2-44B9-825C-8ABD8C236902}"/>
               </a:ext>
             </a:extLst>
           </p:cNvPr>
@@ -1166,7 +1166,7 @@
           <a:p>
             <a:fld id="{1A0AA01A-E3F7-4A63-8F04-B61B41C2BAC6}" type="datetimeFigureOut">
               <a:rPr lang="en-US" smtClean="0"/>
-              <a:t>7/17/2018</a:t>
+              <a:t>7/17/18</a:t>
             </a:fld>
             <a:endParaRPr lang="en-US"/>
           </a:p>
@@ -1177,7 +1177,7 @@
           <p:cNvPr id="5" name="Footer Placeholder 4">
             <a:extLst>
               <a:ext uri="{FF2B5EF4-FFF2-40B4-BE49-F238E27FC236}">
-                <a16:creationId xmlns:a16="http://schemas.microsoft.com/office/drawing/2014/main" id="{802919E2-7994-447F-888D-EE7701F863AF}"/>
+                <a16:creationId xmlns:a16="http://schemas.microsoft.com/office/drawing/2014/main" xmlns="" id="{802919E2-7994-447F-888D-EE7701F863AF}"/>
               </a:ext>
             </a:extLst>
           </p:cNvPr>
@@ -1202,7 +1202,7 @@
           <p:cNvPr id="6" name="Slide Number Placeholder 5">
             <a:extLst>
               <a:ext uri="{FF2B5EF4-FFF2-40B4-BE49-F238E27FC236}">
-                <a16:creationId xmlns:a16="http://schemas.microsoft.com/office/drawing/2014/main" id="{87E33E07-CB81-444B-A799-8881B7B98B3C}"/>
+                <a16:creationId xmlns:a16="http://schemas.microsoft.com/office/drawing/2014/main" xmlns="" id="{87E33E07-CB81-444B-A799-8881B7B98B3C}"/>
               </a:ext>
             </a:extLst>
           </p:cNvPr>
@@ -1261,7 +1261,7 @@
           <p:cNvPr id="2" name="Title 1">
             <a:extLst>
               <a:ext uri="{FF2B5EF4-FFF2-40B4-BE49-F238E27FC236}">
-                <a16:creationId xmlns:a16="http://schemas.microsoft.com/office/drawing/2014/main" id="{2B0060EE-F0F0-43D0-914E-4859F77EF012}"/>
+                <a16:creationId xmlns:a16="http://schemas.microsoft.com/office/drawing/2014/main" xmlns="" id="{2B0060EE-F0F0-43D0-914E-4859F77EF012}"/>
               </a:ext>
             </a:extLst>
           </p:cNvPr>
@@ -1289,7 +1289,7 @@
           <p:cNvPr id="3" name="Content Placeholder 2">
             <a:extLst>
               <a:ext uri="{FF2B5EF4-FFF2-40B4-BE49-F238E27FC236}">
-                <a16:creationId xmlns:a16="http://schemas.microsoft.com/office/drawing/2014/main" id="{28831D21-D216-4D96-8DA8-16BF840E8767}"/>
+                <a16:creationId xmlns:a16="http://schemas.microsoft.com/office/drawing/2014/main" xmlns="" id="{28831D21-D216-4D96-8DA8-16BF840E8767}"/>
               </a:ext>
             </a:extLst>
           </p:cNvPr>
@@ -1351,7 +1351,7 @@
           <p:cNvPr id="4" name="Content Placeholder 3">
             <a:extLst>
               <a:ext uri="{FF2B5EF4-FFF2-40B4-BE49-F238E27FC236}">
-                <a16:creationId xmlns:a16="http://schemas.microsoft.com/office/drawing/2014/main" id="{00AC3A40-B497-4B9A-8297-7C20149C55AD}"/>
+                <a16:creationId xmlns:a16="http://schemas.microsoft.com/office/drawing/2014/main" xmlns="" id="{00AC3A40-B497-4B9A-8297-7C20149C55AD}"/>
               </a:ext>
             </a:extLst>
           </p:cNvPr>
@@ -1413,7 +1413,7 @@
           <p:cNvPr id="5" name="Date Placeholder 4">
             <a:extLst>
               <a:ext uri="{FF2B5EF4-FFF2-40B4-BE49-F238E27FC236}">
-                <a16:creationId xmlns:a16="http://schemas.microsoft.com/office/drawing/2014/main" id="{944182EB-D063-4204-AA16-0C5A4989F5B4}"/>
+                <a16:creationId xmlns:a16="http://schemas.microsoft.com/office/drawing/2014/main" xmlns="" id="{944182EB-D063-4204-AA16-0C5A4989F5B4}"/>
               </a:ext>
             </a:extLst>
           </p:cNvPr>
@@ -1431,7 +1431,7 @@
           <a:p>
             <a:fld id="{1A0AA01A-E3F7-4A63-8F04-B61B41C2BAC6}" type="datetimeFigureOut">
               <a:rPr lang="en-US" smtClean="0"/>
-              <a:t>7/17/2018</a:t>
+              <a:t>7/17/18</a:t>
             </a:fld>
             <a:endParaRPr lang="en-US"/>
           </a:p>
@@ -1442,7 +1442,7 @@
           <p:cNvPr id="6" name="Footer Placeholder 5">
             <a:extLst>
               <a:ext uri="{FF2B5EF4-FFF2-40B4-BE49-F238E27FC236}">
-                <a16:creationId xmlns:a16="http://schemas.microsoft.com/office/drawing/2014/main" id="{4C2A9CF9-17E9-458D-BE24-DEE6561E42D5}"/>
+                <a16:creationId xmlns:a16="http://schemas.microsoft.com/office/drawing/2014/main" xmlns="" id="{4C2A9CF9-17E9-458D-BE24-DEE6561E42D5}"/>
               </a:ext>
             </a:extLst>
           </p:cNvPr>
@@ -1467,7 +1467,7 @@
           <p:cNvPr id="7" name="Slide Number Placeholder 6">
             <a:extLst>
               <a:ext uri="{FF2B5EF4-FFF2-40B4-BE49-F238E27FC236}">
-                <a16:creationId xmlns:a16="http://schemas.microsoft.com/office/drawing/2014/main" id="{56F9E29E-7835-4CFA-99E7-E5FBB4C02BCC}"/>
+                <a16:creationId xmlns:a16="http://schemas.microsoft.com/office/drawing/2014/main" xmlns="" id="{56F9E29E-7835-4CFA-99E7-E5FBB4C02BCC}"/>
               </a:ext>
             </a:extLst>
           </p:cNvPr>
@@ -1526,7 +1526,7 @@
           <p:cNvPr id="2" name="Title 1">
             <a:extLst>
               <a:ext uri="{FF2B5EF4-FFF2-40B4-BE49-F238E27FC236}">
-                <a16:creationId xmlns:a16="http://schemas.microsoft.com/office/drawing/2014/main" id="{E4FED6C2-72DA-44DF-9B88-9588C28F536D}"/>
+                <a16:creationId xmlns:a16="http://schemas.microsoft.com/office/drawing/2014/main" xmlns="" id="{E4FED6C2-72DA-44DF-9B88-9588C28F536D}"/>
               </a:ext>
             </a:extLst>
           </p:cNvPr>
@@ -1559,7 +1559,7 @@
           <p:cNvPr id="3" name="Text Placeholder 2">
             <a:extLst>
               <a:ext uri="{FF2B5EF4-FFF2-40B4-BE49-F238E27FC236}">
-                <a16:creationId xmlns:a16="http://schemas.microsoft.com/office/drawing/2014/main" id="{78F79D41-97D2-4B13-8A45-55FC46B6DCB1}"/>
+                <a16:creationId xmlns:a16="http://schemas.microsoft.com/office/drawing/2014/main" xmlns="" id="{78F79D41-97D2-4B13-8A45-55FC46B6DCB1}"/>
               </a:ext>
             </a:extLst>
           </p:cNvPr>
@@ -1630,7 +1630,7 @@
           <p:cNvPr id="4" name="Content Placeholder 3">
             <a:extLst>
               <a:ext uri="{FF2B5EF4-FFF2-40B4-BE49-F238E27FC236}">
-                <a16:creationId xmlns:a16="http://schemas.microsoft.com/office/drawing/2014/main" id="{BC201B11-39E3-4864-94B7-3502F7E0AF2B}"/>
+                <a16:creationId xmlns:a16="http://schemas.microsoft.com/office/drawing/2014/main" xmlns="" id="{BC201B11-39E3-4864-94B7-3502F7E0AF2B}"/>
               </a:ext>
             </a:extLst>
           </p:cNvPr>
@@ -1692,7 +1692,7 @@
           <p:cNvPr id="5" name="Text Placeholder 4">
             <a:extLst>
               <a:ext uri="{FF2B5EF4-FFF2-40B4-BE49-F238E27FC236}">
-                <a16:creationId xmlns:a16="http://schemas.microsoft.com/office/drawing/2014/main" id="{1BDD9E2F-1520-45EB-957A-AE5781C618BD}"/>
+                <a16:creationId xmlns:a16="http://schemas.microsoft.com/office/drawing/2014/main" xmlns="" id="{1BDD9E2F-1520-45EB-957A-AE5781C618BD}"/>
               </a:ext>
             </a:extLst>
           </p:cNvPr>
@@ -1763,7 +1763,7 @@
           <p:cNvPr id="6" name="Content Placeholder 5">
             <a:extLst>
               <a:ext uri="{FF2B5EF4-FFF2-40B4-BE49-F238E27FC236}">
-                <a16:creationId xmlns:a16="http://schemas.microsoft.com/office/drawing/2014/main" id="{3A2AEF60-EA86-4766-BB37-5A2287762E7E}"/>
+                <a16:creationId xmlns:a16="http://schemas.microsoft.com/office/drawing/2014/main" xmlns="" id="{3A2AEF60-EA86-4766-BB37-5A2287762E7E}"/>
               </a:ext>
             </a:extLst>
           </p:cNvPr>
@@ -1825,7 +1825,7 @@
           <p:cNvPr id="7" name="Date Placeholder 6">
             <a:extLst>
               <a:ext uri="{FF2B5EF4-FFF2-40B4-BE49-F238E27FC236}">
-                <a16:creationId xmlns:a16="http://schemas.microsoft.com/office/drawing/2014/main" id="{4C46220E-7A88-45D1-86BB-8FF34C1C09D5}"/>
+                <a16:creationId xmlns:a16="http://schemas.microsoft.com/office/drawing/2014/main" xmlns="" id="{4C46220E-7A88-45D1-86BB-8FF34C1C09D5}"/>
               </a:ext>
             </a:extLst>
           </p:cNvPr>
@@ -1843,7 +1843,7 @@
           <a:p>
             <a:fld id="{1A0AA01A-E3F7-4A63-8F04-B61B41C2BAC6}" type="datetimeFigureOut">
               <a:rPr lang="en-US" smtClean="0"/>
-              <a:t>7/17/2018</a:t>
+              <a:t>7/17/18</a:t>
             </a:fld>
             <a:endParaRPr lang="en-US"/>
           </a:p>
@@ -1854,7 +1854,7 @@
           <p:cNvPr id="8" name="Footer Placeholder 7">
             <a:extLst>
               <a:ext uri="{FF2B5EF4-FFF2-40B4-BE49-F238E27FC236}">
-                <a16:creationId xmlns:a16="http://schemas.microsoft.com/office/drawing/2014/main" id="{970A498D-3176-4980-AFAC-A2DC9D1981AD}"/>
+                <a16:creationId xmlns:a16="http://schemas.microsoft.com/office/drawing/2014/main" xmlns="" id="{970A498D-3176-4980-AFAC-A2DC9D1981AD}"/>
               </a:ext>
             </a:extLst>
           </p:cNvPr>
@@ -1879,7 +1879,7 @@
           <p:cNvPr id="9" name="Slide Number Placeholder 8">
             <a:extLst>
               <a:ext uri="{FF2B5EF4-FFF2-40B4-BE49-F238E27FC236}">
-                <a16:creationId xmlns:a16="http://schemas.microsoft.com/office/drawing/2014/main" id="{6B7193B4-5009-4BA6-9F73-492C1A3F3D17}"/>
+                <a16:creationId xmlns:a16="http://schemas.microsoft.com/office/drawing/2014/main" xmlns="" id="{6B7193B4-5009-4BA6-9F73-492C1A3F3D17}"/>
               </a:ext>
             </a:extLst>
           </p:cNvPr>
@@ -1938,7 +1938,7 @@
           <p:cNvPr id="2" name="Title 1">
             <a:extLst>
               <a:ext uri="{FF2B5EF4-FFF2-40B4-BE49-F238E27FC236}">
-                <a16:creationId xmlns:a16="http://schemas.microsoft.com/office/drawing/2014/main" id="{6C4E7FEE-E163-437B-A254-CFCB09857D8C}"/>
+                <a16:creationId xmlns:a16="http://schemas.microsoft.com/office/drawing/2014/main" xmlns="" id="{6C4E7FEE-E163-437B-A254-CFCB09857D8C}"/>
               </a:ext>
             </a:extLst>
           </p:cNvPr>
@@ -1966,7 +1966,7 @@
           <p:cNvPr id="3" name="Date Placeholder 2">
             <a:extLst>
               <a:ext uri="{FF2B5EF4-FFF2-40B4-BE49-F238E27FC236}">
-                <a16:creationId xmlns:a16="http://schemas.microsoft.com/office/drawing/2014/main" id="{92626BBC-BA1F-4BF6-9504-76A28F3D149D}"/>
+                <a16:creationId xmlns:a16="http://schemas.microsoft.com/office/drawing/2014/main" xmlns="" id="{92626BBC-BA1F-4BF6-9504-76A28F3D149D}"/>
               </a:ext>
             </a:extLst>
           </p:cNvPr>
@@ -1984,7 +1984,7 @@
           <a:p>
             <a:fld id="{1A0AA01A-E3F7-4A63-8F04-B61B41C2BAC6}" type="datetimeFigureOut">
               <a:rPr lang="en-US" smtClean="0"/>
-              <a:t>7/17/2018</a:t>
+              <a:t>7/17/18</a:t>
             </a:fld>
             <a:endParaRPr lang="en-US"/>
           </a:p>
@@ -1995,7 +1995,7 @@
           <p:cNvPr id="4" name="Footer Placeholder 3">
             <a:extLst>
               <a:ext uri="{FF2B5EF4-FFF2-40B4-BE49-F238E27FC236}">
-                <a16:creationId xmlns:a16="http://schemas.microsoft.com/office/drawing/2014/main" id="{33A80E56-A730-4A1A-A6C8-C5504AE18238}"/>
+                <a16:creationId xmlns:a16="http://schemas.microsoft.com/office/drawing/2014/main" xmlns="" id="{33A80E56-A730-4A1A-A6C8-C5504AE18238}"/>
               </a:ext>
             </a:extLst>
           </p:cNvPr>
@@ -2020,7 +2020,7 @@
           <p:cNvPr id="5" name="Slide Number Placeholder 4">
             <a:extLst>
               <a:ext uri="{FF2B5EF4-FFF2-40B4-BE49-F238E27FC236}">
-                <a16:creationId xmlns:a16="http://schemas.microsoft.com/office/drawing/2014/main" id="{7640FAB0-4C32-4AB9-A4A5-7BEE6E90EFEA}"/>
+                <a16:creationId xmlns:a16="http://schemas.microsoft.com/office/drawing/2014/main" xmlns="" id="{7640FAB0-4C32-4AB9-A4A5-7BEE6E90EFEA}"/>
               </a:ext>
             </a:extLst>
           </p:cNvPr>
@@ -2079,7 +2079,7 @@
           <p:cNvPr id="2" name="Date Placeholder 1">
             <a:extLst>
               <a:ext uri="{FF2B5EF4-FFF2-40B4-BE49-F238E27FC236}">
-                <a16:creationId xmlns:a16="http://schemas.microsoft.com/office/drawing/2014/main" id="{D158B8FD-0961-456F-9924-649D33B53F4B}"/>
+                <a16:creationId xmlns:a16="http://schemas.microsoft.com/office/drawing/2014/main" xmlns="" id="{D158B8FD-0961-456F-9924-649D33B53F4B}"/>
               </a:ext>
             </a:extLst>
           </p:cNvPr>
@@ -2097,7 +2097,7 @@
           <a:p>
             <a:fld id="{1A0AA01A-E3F7-4A63-8F04-B61B41C2BAC6}" type="datetimeFigureOut">
               <a:rPr lang="en-US" smtClean="0"/>
-              <a:t>7/17/2018</a:t>
+              <a:t>7/17/18</a:t>
             </a:fld>
             <a:endParaRPr lang="en-US"/>
           </a:p>
@@ -2108,7 +2108,7 @@
           <p:cNvPr id="3" name="Footer Placeholder 2">
             <a:extLst>
               <a:ext uri="{FF2B5EF4-FFF2-40B4-BE49-F238E27FC236}">
-                <a16:creationId xmlns:a16="http://schemas.microsoft.com/office/drawing/2014/main" id="{8B10A686-108D-4D29-A958-799768D3675C}"/>
+                <a16:creationId xmlns:a16="http://schemas.microsoft.com/office/drawing/2014/main" xmlns="" id="{8B10A686-108D-4D29-A958-799768D3675C}"/>
               </a:ext>
             </a:extLst>
           </p:cNvPr>
@@ -2133,7 +2133,7 @@
           <p:cNvPr id="4" name="Slide Number Placeholder 3">
             <a:extLst>
               <a:ext uri="{FF2B5EF4-FFF2-40B4-BE49-F238E27FC236}">
-                <a16:creationId xmlns:a16="http://schemas.microsoft.com/office/drawing/2014/main" id="{3141E92F-B482-4F29-ACDA-C21951BC1479}"/>
+                <a16:creationId xmlns:a16="http://schemas.microsoft.com/office/drawing/2014/main" xmlns="" id="{3141E92F-B482-4F29-ACDA-C21951BC1479}"/>
               </a:ext>
             </a:extLst>
           </p:cNvPr>
@@ -2192,7 +2192,7 @@
           <p:cNvPr id="2" name="Title 1">
             <a:extLst>
               <a:ext uri="{FF2B5EF4-FFF2-40B4-BE49-F238E27FC236}">
-                <a16:creationId xmlns:a16="http://schemas.microsoft.com/office/drawing/2014/main" id="{92031147-E819-451E-84B9-7ECF08F38740}"/>
+                <a16:creationId xmlns:a16="http://schemas.microsoft.com/office/drawing/2014/main" xmlns="" id="{92031147-E819-451E-84B9-7ECF08F38740}"/>
               </a:ext>
             </a:extLst>
           </p:cNvPr>
@@ -2229,7 +2229,7 @@
           <p:cNvPr id="3" name="Content Placeholder 2">
             <a:extLst>
               <a:ext uri="{FF2B5EF4-FFF2-40B4-BE49-F238E27FC236}">
-                <a16:creationId xmlns:a16="http://schemas.microsoft.com/office/drawing/2014/main" id="{6F1079D1-936C-4DA0-9865-88F2097E8DF5}"/>
+                <a16:creationId xmlns:a16="http://schemas.microsoft.com/office/drawing/2014/main" xmlns="" id="{6F1079D1-936C-4DA0-9865-88F2097E8DF5}"/>
               </a:ext>
             </a:extLst>
           </p:cNvPr>
@@ -2319,7 +2319,7 @@
           <p:cNvPr id="4" name="Text Placeholder 3">
             <a:extLst>
               <a:ext uri="{FF2B5EF4-FFF2-40B4-BE49-F238E27FC236}">
-                <a16:creationId xmlns:a16="http://schemas.microsoft.com/office/drawing/2014/main" id="{5D8A56EB-594D-4E2C-8A7C-65CE8AD92599}"/>
+                <a16:creationId xmlns:a16="http://schemas.microsoft.com/office/drawing/2014/main" xmlns="" id="{5D8A56EB-594D-4E2C-8A7C-65CE8AD92599}"/>
               </a:ext>
             </a:extLst>
           </p:cNvPr>
@@ -2390,7 +2390,7 @@
           <p:cNvPr id="5" name="Date Placeholder 4">
             <a:extLst>
               <a:ext uri="{FF2B5EF4-FFF2-40B4-BE49-F238E27FC236}">
-                <a16:creationId xmlns:a16="http://schemas.microsoft.com/office/drawing/2014/main" id="{6A52BE7E-D098-4F76-973F-193D731FC8D4}"/>
+                <a16:creationId xmlns:a16="http://schemas.microsoft.com/office/drawing/2014/main" xmlns="" id="{6A52BE7E-D098-4F76-973F-193D731FC8D4}"/>
               </a:ext>
             </a:extLst>
           </p:cNvPr>
@@ -2408,7 +2408,7 @@
           <a:p>
             <a:fld id="{1A0AA01A-E3F7-4A63-8F04-B61B41C2BAC6}" type="datetimeFigureOut">
               <a:rPr lang="en-US" smtClean="0"/>
-              <a:t>7/17/2018</a:t>
+              <a:t>7/17/18</a:t>
             </a:fld>
             <a:endParaRPr lang="en-US"/>
           </a:p>
@@ -2419,7 +2419,7 @@
           <p:cNvPr id="6" name="Footer Placeholder 5">
             <a:extLst>
               <a:ext uri="{FF2B5EF4-FFF2-40B4-BE49-F238E27FC236}">
-                <a16:creationId xmlns:a16="http://schemas.microsoft.com/office/drawing/2014/main" id="{4D3FD585-B6BD-4E85-B56E-49517C594CFD}"/>
+                <a16:creationId xmlns:a16="http://schemas.microsoft.com/office/drawing/2014/main" xmlns="" id="{4D3FD585-B6BD-4E85-B56E-49517C594CFD}"/>
               </a:ext>
             </a:extLst>
           </p:cNvPr>
@@ -2444,7 +2444,7 @@
           <p:cNvPr id="7" name="Slide Number Placeholder 6">
             <a:extLst>
               <a:ext uri="{FF2B5EF4-FFF2-40B4-BE49-F238E27FC236}">
-                <a16:creationId xmlns:a16="http://schemas.microsoft.com/office/drawing/2014/main" id="{BD17EA66-4E63-4C74-AAB6-FCF5C9E621D9}"/>
+                <a16:creationId xmlns:a16="http://schemas.microsoft.com/office/drawing/2014/main" xmlns="" id="{BD17EA66-4E63-4C74-AAB6-FCF5C9E621D9}"/>
               </a:ext>
             </a:extLst>
           </p:cNvPr>
@@ -2503,7 +2503,7 @@
           <p:cNvPr id="2" name="Title 1">
             <a:extLst>
               <a:ext uri="{FF2B5EF4-FFF2-40B4-BE49-F238E27FC236}">
-                <a16:creationId xmlns:a16="http://schemas.microsoft.com/office/drawing/2014/main" id="{0A7A5070-91B6-4077-8C4E-D7C7C95F821F}"/>
+                <a16:creationId xmlns:a16="http://schemas.microsoft.com/office/drawing/2014/main" xmlns="" id="{0A7A5070-91B6-4077-8C4E-D7C7C95F821F}"/>
               </a:ext>
             </a:extLst>
           </p:cNvPr>
@@ -2540,7 +2540,7 @@
           <p:cNvPr id="3" name="Picture Placeholder 2">
             <a:extLst>
               <a:ext uri="{FF2B5EF4-FFF2-40B4-BE49-F238E27FC236}">
-                <a16:creationId xmlns:a16="http://schemas.microsoft.com/office/drawing/2014/main" id="{EF81B1A0-AD71-49BC-9AD3-7179474F90F4}"/>
+                <a16:creationId xmlns:a16="http://schemas.microsoft.com/office/drawing/2014/main" xmlns="" id="{EF81B1A0-AD71-49BC-9AD3-7179474F90F4}"/>
               </a:ext>
             </a:extLst>
           </p:cNvPr>
@@ -2607,7 +2607,7 @@
           <p:cNvPr id="4" name="Text Placeholder 3">
             <a:extLst>
               <a:ext uri="{FF2B5EF4-FFF2-40B4-BE49-F238E27FC236}">
-                <a16:creationId xmlns:a16="http://schemas.microsoft.com/office/drawing/2014/main" id="{E9DFD63F-B968-44B9-A649-3E2ED7D32F5D}"/>
+                <a16:creationId xmlns:a16="http://schemas.microsoft.com/office/drawing/2014/main" xmlns="" id="{E9DFD63F-B968-44B9-A649-3E2ED7D32F5D}"/>
               </a:ext>
             </a:extLst>
           </p:cNvPr>
@@ -2678,7 +2678,7 @@
           <p:cNvPr id="5" name="Date Placeholder 4">
             <a:extLst>
               <a:ext uri="{FF2B5EF4-FFF2-40B4-BE49-F238E27FC236}">
-                <a16:creationId xmlns:a16="http://schemas.microsoft.com/office/drawing/2014/main" id="{7FC4A91B-E622-4ED8-B679-2F816CB01C5C}"/>
+                <a16:creationId xmlns:a16="http://schemas.microsoft.com/office/drawing/2014/main" xmlns="" id="{7FC4A91B-E622-4ED8-B679-2F816CB01C5C}"/>
               </a:ext>
             </a:extLst>
           </p:cNvPr>
@@ -2696,7 +2696,7 @@
           <a:p>
             <a:fld id="{1A0AA01A-E3F7-4A63-8F04-B61B41C2BAC6}" type="datetimeFigureOut">
               <a:rPr lang="en-US" smtClean="0"/>
-              <a:t>7/17/2018</a:t>
+              <a:t>7/17/18</a:t>
             </a:fld>
             <a:endParaRPr lang="en-US"/>
           </a:p>
@@ -2707,7 +2707,7 @@
           <p:cNvPr id="6" name="Footer Placeholder 5">
             <a:extLst>
               <a:ext uri="{FF2B5EF4-FFF2-40B4-BE49-F238E27FC236}">
-                <a16:creationId xmlns:a16="http://schemas.microsoft.com/office/drawing/2014/main" id="{4753484D-0557-43FF-BF13-ECF59647B4AB}"/>
+                <a16:creationId xmlns:a16="http://schemas.microsoft.com/office/drawing/2014/main" xmlns="" id="{4753484D-0557-43FF-BF13-ECF59647B4AB}"/>
               </a:ext>
             </a:extLst>
           </p:cNvPr>
@@ -2732,7 +2732,7 @@
           <p:cNvPr id="7" name="Slide Number Placeholder 6">
             <a:extLst>
               <a:ext uri="{FF2B5EF4-FFF2-40B4-BE49-F238E27FC236}">
-                <a16:creationId xmlns:a16="http://schemas.microsoft.com/office/drawing/2014/main" id="{043A778A-B4F1-4915-A7A4-4BAF5ED95FC6}"/>
+                <a16:creationId xmlns:a16="http://schemas.microsoft.com/office/drawing/2014/main" xmlns="" id="{043A778A-B4F1-4915-A7A4-4BAF5ED95FC6}"/>
               </a:ext>
             </a:extLst>
           </p:cNvPr>
@@ -2796,7 +2796,7 @@
           <p:cNvPr id="2" name="Title Placeholder 1">
             <a:extLst>
               <a:ext uri="{FF2B5EF4-FFF2-40B4-BE49-F238E27FC236}">
-                <a16:creationId xmlns:a16="http://schemas.microsoft.com/office/drawing/2014/main" id="{9D0FEC6D-E849-4B42-A23B-3A8C3F5844F9}"/>
+                <a16:creationId xmlns:a16="http://schemas.microsoft.com/office/drawing/2014/main" xmlns="" id="{9D0FEC6D-E849-4B42-A23B-3A8C3F5844F9}"/>
               </a:ext>
             </a:extLst>
           </p:cNvPr>
@@ -2834,7 +2834,7 @@
           <p:cNvPr id="3" name="Text Placeholder 2">
             <a:extLst>
               <a:ext uri="{FF2B5EF4-FFF2-40B4-BE49-F238E27FC236}">
-                <a16:creationId xmlns:a16="http://schemas.microsoft.com/office/drawing/2014/main" id="{9D3866CF-217C-4B4D-B4BA-A30DF06D16EC}"/>
+                <a16:creationId xmlns:a16="http://schemas.microsoft.com/office/drawing/2014/main" xmlns="" id="{9D3866CF-217C-4B4D-B4BA-A30DF06D16EC}"/>
               </a:ext>
             </a:extLst>
           </p:cNvPr>
@@ -2901,7 +2901,7 @@
           <p:cNvPr id="4" name="Date Placeholder 3">
             <a:extLst>
               <a:ext uri="{FF2B5EF4-FFF2-40B4-BE49-F238E27FC236}">
-                <a16:creationId xmlns:a16="http://schemas.microsoft.com/office/drawing/2014/main" id="{90E3BA69-C110-4A73-8A8E-0835BAF2B110}"/>
+                <a16:creationId xmlns:a16="http://schemas.microsoft.com/office/drawing/2014/main" xmlns="" id="{90E3BA69-C110-4A73-8A8E-0835BAF2B110}"/>
               </a:ext>
             </a:extLst>
           </p:cNvPr>
@@ -2937,7 +2937,7 @@
           <a:p>
             <a:fld id="{1A0AA01A-E3F7-4A63-8F04-B61B41C2BAC6}" type="datetimeFigureOut">
               <a:rPr lang="en-US" smtClean="0"/>
-              <a:t>7/17/2018</a:t>
+              <a:t>7/17/18</a:t>
             </a:fld>
             <a:endParaRPr lang="en-US"/>
           </a:p>
@@ -2948,7 +2948,7 @@
           <p:cNvPr id="5" name="Footer Placeholder 4">
             <a:extLst>
               <a:ext uri="{FF2B5EF4-FFF2-40B4-BE49-F238E27FC236}">
-                <a16:creationId xmlns:a16="http://schemas.microsoft.com/office/drawing/2014/main" id="{D4D2E813-F602-487A-8D67-22F874732B45}"/>
+                <a16:creationId xmlns:a16="http://schemas.microsoft.com/office/drawing/2014/main" xmlns="" id="{D4D2E813-F602-487A-8D67-22F874732B45}"/>
               </a:ext>
             </a:extLst>
           </p:cNvPr>
@@ -2991,7 +2991,7 @@
           <p:cNvPr id="6" name="Slide Number Placeholder 5">
             <a:extLst>
               <a:ext uri="{FF2B5EF4-FFF2-40B4-BE49-F238E27FC236}">
-                <a16:creationId xmlns:a16="http://schemas.microsoft.com/office/drawing/2014/main" id="{38E08855-5D00-45A4-908E-4231A4A99731}"/>
+                <a16:creationId xmlns:a16="http://schemas.microsoft.com/office/drawing/2014/main" xmlns="" id="{38E08855-5D00-45A4-908E-4231A4A99731}"/>
               </a:ext>
             </a:extLst>
           </p:cNvPr>
@@ -3359,7 +3359,7 @@
           <p:cNvPr id="7" name="Content Placeholder 6">
             <a:extLst>
               <a:ext uri="{FF2B5EF4-FFF2-40B4-BE49-F238E27FC236}">
-                <a16:creationId xmlns:a16="http://schemas.microsoft.com/office/drawing/2014/main" id="{2ED4FA8B-A34C-4B4B-BEEA-8774FAEE7B1F}"/>
+                <a16:creationId xmlns:a16="http://schemas.microsoft.com/office/drawing/2014/main" xmlns="" id="{2ED4FA8B-A34C-4B4B-BEEA-8774FAEE7B1F}"/>
               </a:ext>
             </a:extLst>
           </p:cNvPr>
@@ -3391,7 +3391,7 @@
           <p:cNvPr id="5" name="TextBox 4">
             <a:extLst>
               <a:ext uri="{FF2B5EF4-FFF2-40B4-BE49-F238E27FC236}">
-                <a16:creationId xmlns:a16="http://schemas.microsoft.com/office/drawing/2014/main" id="{88C82039-85FA-4BF4-AC27-C40913378645}"/>
+                <a16:creationId xmlns:a16="http://schemas.microsoft.com/office/drawing/2014/main" xmlns="" id="{88C82039-85FA-4BF4-AC27-C40913378645}"/>
               </a:ext>
             </a:extLst>
           </p:cNvPr>
@@ -3438,7 +3438,7 @@
           <p:cNvPr id="6" name="TextBox 5">
             <a:extLst>
               <a:ext uri="{FF2B5EF4-FFF2-40B4-BE49-F238E27FC236}">
-                <a16:creationId xmlns:a16="http://schemas.microsoft.com/office/drawing/2014/main" id="{69DC936F-F589-453E-82A2-22EBE990ED1F}"/>
+                <a16:creationId xmlns:a16="http://schemas.microsoft.com/office/drawing/2014/main" xmlns="" id="{69DC936F-F589-453E-82A2-22EBE990ED1F}"/>
               </a:ext>
             </a:extLst>
           </p:cNvPr>
@@ -3525,7 +3525,7 @@
           <p:cNvPr id="10" name="Content Placeholder 4">
             <a:extLst>
               <a:ext uri="{FF2B5EF4-FFF2-40B4-BE49-F238E27FC236}">
-                <a16:creationId xmlns:a16="http://schemas.microsoft.com/office/drawing/2014/main" id="{133AE8EF-EFDF-4494-9F5B-1BEDB1D1F592}"/>
+                <a16:creationId xmlns:a16="http://schemas.microsoft.com/office/drawing/2014/main" xmlns="" id="{133AE8EF-EFDF-4494-9F5B-1BEDB1D1F592}"/>
               </a:ext>
             </a:extLst>
           </p:cNvPr>
@@ -3560,7 +3560,7 @@
           <p:cNvPr id="7" name="Picture 6">
             <a:extLst>
               <a:ext uri="{FF2B5EF4-FFF2-40B4-BE49-F238E27FC236}">
-                <a16:creationId xmlns:a16="http://schemas.microsoft.com/office/drawing/2014/main" id="{55EAC059-9270-46E8-829A-58F0A8C37152}"/>
+                <a16:creationId xmlns:a16="http://schemas.microsoft.com/office/drawing/2014/main" xmlns="" id="{55EAC059-9270-46E8-829A-58F0A8C37152}"/>
               </a:ext>
             </a:extLst>
           </p:cNvPr>
@@ -3596,7 +3596,7 @@
           <p:cNvPr id="9" name="Picture 8">
             <a:extLst>
               <a:ext uri="{FF2B5EF4-FFF2-40B4-BE49-F238E27FC236}">
-                <a16:creationId xmlns:a16="http://schemas.microsoft.com/office/drawing/2014/main" id="{CF9F5FAA-4882-467A-8983-AAA61BA27D70}"/>
+                <a16:creationId xmlns:a16="http://schemas.microsoft.com/office/drawing/2014/main" xmlns="" id="{CF9F5FAA-4882-467A-8983-AAA61BA27D70}"/>
               </a:ext>
             </a:extLst>
           </p:cNvPr>
@@ -3632,7 +3632,7 @@
           <p:cNvPr id="18" name="Picture 17">
             <a:extLst>
               <a:ext uri="{FF2B5EF4-FFF2-40B4-BE49-F238E27FC236}">
-                <a16:creationId xmlns:a16="http://schemas.microsoft.com/office/drawing/2014/main" id="{E3EE6A28-1A5D-4399-97A9-7D6C47722C8D}"/>
+                <a16:creationId xmlns:a16="http://schemas.microsoft.com/office/drawing/2014/main" xmlns="" id="{E3EE6A28-1A5D-4399-97A9-7D6C47722C8D}"/>
               </a:ext>
             </a:extLst>
           </p:cNvPr>
@@ -3668,7 +3668,7 @@
           <p:cNvPr id="22" name="Picture 21">
             <a:extLst>
               <a:ext uri="{FF2B5EF4-FFF2-40B4-BE49-F238E27FC236}">
-                <a16:creationId xmlns:a16="http://schemas.microsoft.com/office/drawing/2014/main" id="{B11D1B36-C266-441F-AC72-3F7E40EB2BB5}"/>
+                <a16:creationId xmlns:a16="http://schemas.microsoft.com/office/drawing/2014/main" xmlns="" id="{B11D1B36-C266-441F-AC72-3F7E40EB2BB5}"/>
               </a:ext>
             </a:extLst>
           </p:cNvPr>
@@ -3704,7 +3704,7 @@
           <p:cNvPr id="24" name="Picture 23">
             <a:extLst>
               <a:ext uri="{FF2B5EF4-FFF2-40B4-BE49-F238E27FC236}">
-                <a16:creationId xmlns:a16="http://schemas.microsoft.com/office/drawing/2014/main" id="{3F7E0BB0-F46A-4C76-A148-0C1BF6761779}"/>
+                <a16:creationId xmlns:a16="http://schemas.microsoft.com/office/drawing/2014/main" xmlns="" id="{3F7E0BB0-F46A-4C76-A148-0C1BF6761779}"/>
               </a:ext>
             </a:extLst>
           </p:cNvPr>
@@ -3740,7 +3740,7 @@
           <p:cNvPr id="26" name="Picture 25">
             <a:extLst>
               <a:ext uri="{FF2B5EF4-FFF2-40B4-BE49-F238E27FC236}">
-                <a16:creationId xmlns:a16="http://schemas.microsoft.com/office/drawing/2014/main" id="{44135789-27E2-463E-B7E2-18EE7A7FC83F}"/>
+                <a16:creationId xmlns:a16="http://schemas.microsoft.com/office/drawing/2014/main" xmlns="" id="{44135789-27E2-463E-B7E2-18EE7A7FC83F}"/>
               </a:ext>
             </a:extLst>
           </p:cNvPr>
@@ -3776,7 +3776,7 @@
           <p:cNvPr id="11" name="Picture 10">
             <a:extLst>
               <a:ext uri="{FF2B5EF4-FFF2-40B4-BE49-F238E27FC236}">
-                <a16:creationId xmlns:a16="http://schemas.microsoft.com/office/drawing/2014/main" id="{CAC65ED9-61C1-4AB4-A331-C41C5A4385FD}"/>
+                <a16:creationId xmlns:a16="http://schemas.microsoft.com/office/drawing/2014/main" xmlns="" id="{CAC65ED9-61C1-4AB4-A331-C41C5A4385FD}"/>
               </a:ext>
             </a:extLst>
           </p:cNvPr>
@@ -3842,7 +3842,7 @@
           <p:cNvPr id="4" name="Picture 3">
             <a:extLst>
               <a:ext uri="{FF2B5EF4-FFF2-40B4-BE49-F238E27FC236}">
-                <a16:creationId xmlns:a16="http://schemas.microsoft.com/office/drawing/2014/main" id="{3C5167A5-B286-4521-A48F-6E3D279F60B0}"/>
+                <a16:creationId xmlns:a16="http://schemas.microsoft.com/office/drawing/2014/main" xmlns="" id="{3C5167A5-B286-4521-A48F-6E3D279F60B0}"/>
               </a:ext>
             </a:extLst>
           </p:cNvPr>
@@ -3872,7 +3872,7 @@
           <p:cNvPr id="6" name="Rectangle 5">
             <a:extLst>
               <a:ext uri="{FF2B5EF4-FFF2-40B4-BE49-F238E27FC236}">
-                <a16:creationId xmlns:a16="http://schemas.microsoft.com/office/drawing/2014/main" id="{D22457CD-5326-4C6B-BE3C-D62A576B7DB8}"/>
+                <a16:creationId xmlns:a16="http://schemas.microsoft.com/office/drawing/2014/main" xmlns="" id="{D22457CD-5326-4C6B-BE3C-D62A576B7DB8}"/>
               </a:ext>
             </a:extLst>
           </p:cNvPr>
@@ -3946,7 +3946,7 @@
           <p:cNvPr id="7" name="TextBox 6">
             <a:extLst>
               <a:ext uri="{FF2B5EF4-FFF2-40B4-BE49-F238E27FC236}">
-                <a16:creationId xmlns:a16="http://schemas.microsoft.com/office/drawing/2014/main" id="{CE0E1757-5D9E-4B4E-A6DB-94E9096C5DE5}"/>
+                <a16:creationId xmlns:a16="http://schemas.microsoft.com/office/drawing/2014/main" xmlns="" id="{CE0E1757-5D9E-4B4E-A6DB-94E9096C5DE5}"/>
               </a:ext>
             </a:extLst>
           </p:cNvPr>
@@ -4087,7 +4087,7 @@
           <p:cNvPr id="2" name="Title 1">
             <a:extLst>
               <a:ext uri="{FF2B5EF4-FFF2-40B4-BE49-F238E27FC236}">
-                <a16:creationId xmlns:a16="http://schemas.microsoft.com/office/drawing/2014/main" id="{7C90CA8C-6776-4471-99A8-FA983D71A002}"/>
+                <a16:creationId xmlns:a16="http://schemas.microsoft.com/office/drawing/2014/main" xmlns="" id="{7C90CA8C-6776-4471-99A8-FA983D71A002}"/>
               </a:ext>
             </a:extLst>
           </p:cNvPr>
@@ -4115,7 +4115,7 @@
           <p:cNvPr id="6" name="Picture 5">
             <a:extLst>
               <a:ext uri="{FF2B5EF4-FFF2-40B4-BE49-F238E27FC236}">
-                <a16:creationId xmlns:a16="http://schemas.microsoft.com/office/drawing/2014/main" id="{AA1413CA-C44D-44D7-A529-C7D24DF8FB9E}"/>
+                <a16:creationId xmlns:a16="http://schemas.microsoft.com/office/drawing/2014/main" xmlns="" id="{AA1413CA-C44D-44D7-A529-C7D24DF8FB9E}"/>
               </a:ext>
             </a:extLst>
           </p:cNvPr>
@@ -4151,7 +4151,7 @@
           <p:cNvPr id="3" name="Rectangle 2">
             <a:extLst>
               <a:ext uri="{FF2B5EF4-FFF2-40B4-BE49-F238E27FC236}">
-                <a16:creationId xmlns:a16="http://schemas.microsoft.com/office/drawing/2014/main" id="{53483F9B-BA18-46A0-A4D4-C5DEACCCF1C2}"/>
+                <a16:creationId xmlns:a16="http://schemas.microsoft.com/office/drawing/2014/main" xmlns="" id="{53483F9B-BA18-46A0-A4D4-C5DEACCCF1C2}"/>
               </a:ext>
             </a:extLst>
           </p:cNvPr>
@@ -4160,7 +4160,7 @@
         </p:nvSpPr>
         <p:spPr>
           <a:xfrm>
-            <a:off x="2703945" y="5170048"/>
+            <a:off x="2703945" y="4799929"/>
             <a:ext cx="3215880" cy="369332"/>
           </a:xfrm>
           <a:prstGeom prst="rect">
@@ -4185,7 +4185,7 @@
           <p:cNvPr id="4" name="Rectangle 3">
             <a:extLst>
               <a:ext uri="{FF2B5EF4-FFF2-40B4-BE49-F238E27FC236}">
-                <a16:creationId xmlns:a16="http://schemas.microsoft.com/office/drawing/2014/main" id="{A9A316FC-0101-4A1F-B37E-EC9600339A34}"/>
+                <a16:creationId xmlns:a16="http://schemas.microsoft.com/office/drawing/2014/main" xmlns="" id="{A9A316FC-0101-4A1F-B37E-EC9600339A34}"/>
               </a:ext>
             </a:extLst>
           </p:cNvPr>
@@ -4194,7 +4194,7 @@
         </p:nvSpPr>
         <p:spPr>
           <a:xfrm>
-            <a:off x="2703945" y="5539380"/>
+            <a:off x="2703945" y="5169261"/>
             <a:ext cx="6110519" cy="369332"/>
           </a:xfrm>
           <a:prstGeom prst="rect">
@@ -4219,7 +4219,7 @@
           <p:cNvPr id="5" name="Rectangle 4">
             <a:extLst>
               <a:ext uri="{FF2B5EF4-FFF2-40B4-BE49-F238E27FC236}">
-                <a16:creationId xmlns:a16="http://schemas.microsoft.com/office/drawing/2014/main" id="{3628BF43-33B2-4DA9-8A38-8269B346DD40}"/>
+                <a16:creationId xmlns:a16="http://schemas.microsoft.com/office/drawing/2014/main" xmlns="" id="{3628BF43-33B2-4DA9-8A38-8269B346DD40}"/>
               </a:ext>
             </a:extLst>
           </p:cNvPr>
@@ -4228,7 +4228,7 @@
         </p:nvSpPr>
         <p:spPr>
           <a:xfrm>
-            <a:off x="2703945" y="5915388"/>
+            <a:off x="2703945" y="5545269"/>
             <a:ext cx="4115550" cy="369332"/>
           </a:xfrm>
           <a:prstGeom prst="rect">
@@ -4253,7 +4253,7 @@
           <p:cNvPr id="7" name="Rectangle 1">
             <a:extLst>
               <a:ext uri="{FF2B5EF4-FFF2-40B4-BE49-F238E27FC236}">
-                <a16:creationId xmlns:a16="http://schemas.microsoft.com/office/drawing/2014/main" id="{47408AE1-3C4D-4B7D-B7D8-B3EE08739FD2}"/>
+                <a16:creationId xmlns:a16="http://schemas.microsoft.com/office/drawing/2014/main" xmlns="" id="{47408AE1-3C4D-4B7D-B7D8-B3EE08739FD2}"/>
               </a:ext>
             </a:extLst>
           </p:cNvPr>
@@ -4398,7 +4398,7 @@
           <p:cNvPr id="8" name="TextBox 7">
             <a:extLst>
               <a:ext uri="{FF2B5EF4-FFF2-40B4-BE49-F238E27FC236}">
-                <a16:creationId xmlns:a16="http://schemas.microsoft.com/office/drawing/2014/main" id="{9C4C4FBA-5568-4B6C-B3CE-AEF4C5E076D2}"/>
+                <a16:creationId xmlns:a16="http://schemas.microsoft.com/office/drawing/2014/main" xmlns="" id="{9C4C4FBA-5568-4B6C-B3CE-AEF4C5E076D2}"/>
               </a:ext>
             </a:extLst>
           </p:cNvPr>
@@ -4407,7 +4407,7 @@
         </p:nvSpPr>
         <p:spPr>
           <a:xfrm>
-            <a:off x="572655" y="5176724"/>
+            <a:off x="572655" y="4806605"/>
             <a:ext cx="1508426" cy="369332"/>
           </a:xfrm>
           <a:prstGeom prst="rect">
@@ -4433,7 +4433,7 @@
           <p:cNvPr id="9" name="TextBox 8">
             <a:extLst>
               <a:ext uri="{FF2B5EF4-FFF2-40B4-BE49-F238E27FC236}">
-                <a16:creationId xmlns:a16="http://schemas.microsoft.com/office/drawing/2014/main" id="{CA878E6A-43CA-4035-8FC5-C68BA4A71B66}"/>
+                <a16:creationId xmlns:a16="http://schemas.microsoft.com/office/drawing/2014/main" xmlns="" id="{CA878E6A-43CA-4035-8FC5-C68BA4A71B66}"/>
               </a:ext>
             </a:extLst>
           </p:cNvPr>
@@ -4442,7 +4442,7 @@
         </p:nvSpPr>
         <p:spPr>
           <a:xfrm>
-            <a:off x="563418" y="5546056"/>
+            <a:off x="563418" y="5175937"/>
             <a:ext cx="2227854" cy="369332"/>
           </a:xfrm>
           <a:prstGeom prst="rect">
@@ -4468,7 +4468,7 @@
           <p:cNvPr id="10" name="TextBox 9">
             <a:extLst>
               <a:ext uri="{FF2B5EF4-FFF2-40B4-BE49-F238E27FC236}">
-                <a16:creationId xmlns:a16="http://schemas.microsoft.com/office/drawing/2014/main" id="{8D686006-6C58-40D5-884C-653688E24050}"/>
+                <a16:creationId xmlns:a16="http://schemas.microsoft.com/office/drawing/2014/main" xmlns="" id="{8D686006-6C58-40D5-884C-653688E24050}"/>
               </a:ext>
             </a:extLst>
           </p:cNvPr>
@@ -4477,7 +4477,7 @@
         </p:nvSpPr>
         <p:spPr>
           <a:xfrm>
-            <a:off x="563418" y="5915388"/>
+            <a:off x="563418" y="5545269"/>
             <a:ext cx="1671035" cy="369332"/>
           </a:xfrm>
           <a:prstGeom prst="rect">
@@ -4495,6 +4495,86 @@
               <a:rPr lang="en-US" dirty="0"/>
               <a:t>Spock examples</a:t>
             </a:r>
+          </a:p>
+        </p:txBody>
+      </p:sp>
+      <p:sp>
+        <p:nvSpPr>
+          <p:cNvPr id="11" name="TextBox 10"/>
+          <p:cNvSpPr txBox="1"/>
+          <p:nvPr/>
+        </p:nvSpPr>
+        <p:spPr>
+          <a:xfrm>
+            <a:off x="2703945" y="5921277"/>
+            <a:ext cx="4320991" cy="369332"/>
+          </a:xfrm>
+          <a:prstGeom prst="rect">
+            <a:avLst/>
+          </a:prstGeom>
+          <a:noFill/>
+        </p:spPr>
+        <p:txBody>
+          <a:bodyPr wrap="none" rtlCol="0">
+            <a:spAutoFit/>
+          </a:bodyPr>
+          <a:lstStyle/>
+          <a:p>
+            <a:r>
+              <a:rPr lang="en-US" dirty="0"/>
+              <a:t>https://</a:t>
+            </a:r>
+            <a:r>
+              <a:rPr lang="en-US" dirty="0" err="1"/>
+              <a:t>github.com</a:t>
+            </a:r>
+            <a:r>
+              <a:rPr lang="en-US" dirty="0"/>
+              <a:t>/</a:t>
+            </a:r>
+            <a:r>
+              <a:rPr lang="en-US" dirty="0" err="1"/>
+              <a:t>chjansen</a:t>
+            </a:r>
+            <a:r>
+              <a:rPr lang="en-US" dirty="0"/>
+              <a:t>/</a:t>
+            </a:r>
+            <a:r>
+              <a:rPr lang="en-US" dirty="0" err="1"/>
+              <a:t>SpockExample</a:t>
+            </a:r>
+            <a:endParaRPr lang="en-US" dirty="0"/>
+          </a:p>
+        </p:txBody>
+      </p:sp>
+      <p:sp>
+        <p:nvSpPr>
+          <p:cNvPr id="12" name="TextBox 11"/>
+          <p:cNvSpPr txBox="1"/>
+          <p:nvPr/>
+        </p:nvSpPr>
+        <p:spPr>
+          <a:xfrm>
+            <a:off x="572655" y="5921277"/>
+            <a:ext cx="1512594" cy="369332"/>
+          </a:xfrm>
+          <a:prstGeom prst="rect">
+            <a:avLst/>
+          </a:prstGeom>
+          <a:noFill/>
+        </p:spPr>
+        <p:txBody>
+          <a:bodyPr wrap="none" rtlCol="0">
+            <a:spAutoFit/>
+          </a:bodyPr>
+          <a:lstStyle/>
+          <a:p>
+            <a:r>
+              <a:rPr lang="en-US" smtClean="0"/>
+              <a:t>Example Code</a:t>
+            </a:r>
+            <a:endParaRPr lang="en-US"/>
           </a:p>
         </p:txBody>
       </p:sp>
@@ -4533,7 +4613,7 @@
           <p:cNvPr id="5" name="Rectangle 1">
             <a:extLst>
               <a:ext uri="{FF2B5EF4-FFF2-40B4-BE49-F238E27FC236}">
-                <a16:creationId xmlns:a16="http://schemas.microsoft.com/office/drawing/2014/main" id="{7E5A8962-243C-41D5-8B32-06E28D22A557}"/>
+                <a16:creationId xmlns:a16="http://schemas.microsoft.com/office/drawing/2014/main" xmlns="" id="{7E5A8962-243C-41D5-8B32-06E28D22A557}"/>
               </a:ext>
             </a:extLst>
           </p:cNvPr>
@@ -4940,6 +5020,20 @@
                 <a:cs typeface="Courier New" panose="02070309020205020404" pitchFamily="49" charset="0"/>
               </a:rPr>
             </a:br>
+            <a:r>
+              <a:rPr kumimoji="0" lang="en-US" altLang="en-US" b="0" i="0" u="none" strike="noStrike" cap="none" normalizeH="0" baseline="0" dirty="0">
+                <a:ln>
+                  <a:noFill/>
+                </a:ln>
+                <a:solidFill>
+                  <a:srgbClr val="000000"/>
+                </a:solidFill>
+                <a:effectLst/>
+                <a:latin typeface="Courier New" panose="02070309020205020404" pitchFamily="49" charset="0"/>
+                <a:cs typeface="Courier New" panose="02070309020205020404" pitchFamily="49" charset="0"/>
+              </a:rPr>
+              <a:t/>
+            </a:r>
             <a:br>
               <a:rPr kumimoji="0" lang="en-US" altLang="en-US" b="0" i="0" u="none" strike="noStrike" cap="none" normalizeH="0" baseline="0" dirty="0">
                 <a:ln>
@@ -5330,7 +5424,7 @@
           <p:cNvPr id="6" name="Rectangle 2">
             <a:extLst>
               <a:ext uri="{FF2B5EF4-FFF2-40B4-BE49-F238E27FC236}">
-                <a16:creationId xmlns:a16="http://schemas.microsoft.com/office/drawing/2014/main" id="{73421435-CAC4-4959-AE29-D4008943AA42}"/>
+                <a16:creationId xmlns:a16="http://schemas.microsoft.com/office/drawing/2014/main" xmlns="" id="{73421435-CAC4-4959-AE29-D4008943AA42}"/>
               </a:ext>
             </a:extLst>
           </p:cNvPr>
@@ -5946,7 +6040,7 @@
           <p:cNvPr id="4" name="Rectangle 3">
             <a:extLst>
               <a:ext uri="{FF2B5EF4-FFF2-40B4-BE49-F238E27FC236}">
-                <a16:creationId xmlns:a16="http://schemas.microsoft.com/office/drawing/2014/main" id="{B0EF4A40-C566-4D9D-A1C2-80DE1DF5CE78}"/>
+                <a16:creationId xmlns:a16="http://schemas.microsoft.com/office/drawing/2014/main" xmlns="" id="{B0EF4A40-C566-4D9D-A1C2-80DE1DF5CE78}"/>
               </a:ext>
             </a:extLst>
           </p:cNvPr>
@@ -5986,7 +6080,7 @@
           <p:cNvPr id="5" name="Rectangle 4">
             <a:extLst>
               <a:ext uri="{FF2B5EF4-FFF2-40B4-BE49-F238E27FC236}">
-                <a16:creationId xmlns:a16="http://schemas.microsoft.com/office/drawing/2014/main" id="{24179E91-080B-4E23-845B-C64EF30D2E88}"/>
+                <a16:creationId xmlns:a16="http://schemas.microsoft.com/office/drawing/2014/main" xmlns="" id="{24179E91-080B-4E23-845B-C64EF30D2E88}"/>
               </a:ext>
             </a:extLst>
           </p:cNvPr>
@@ -6026,7 +6120,7 @@
           <p:cNvPr id="6" name="Rectangle 5">
             <a:extLst>
               <a:ext uri="{FF2B5EF4-FFF2-40B4-BE49-F238E27FC236}">
-                <a16:creationId xmlns:a16="http://schemas.microsoft.com/office/drawing/2014/main" id="{FD8C8A0E-D104-4D84-9C84-A0A8745B0410}"/>
+                <a16:creationId xmlns:a16="http://schemas.microsoft.com/office/drawing/2014/main" xmlns="" id="{FD8C8A0E-D104-4D84-9C84-A0A8745B0410}"/>
               </a:ext>
             </a:extLst>
           </p:cNvPr>
@@ -6066,7 +6160,7 @@
           <p:cNvPr id="7" name="Rectangle 6">
             <a:extLst>
               <a:ext uri="{FF2B5EF4-FFF2-40B4-BE49-F238E27FC236}">
-                <a16:creationId xmlns:a16="http://schemas.microsoft.com/office/drawing/2014/main" id="{3571319E-0245-41BE-8876-5FABD16D418A}"/>
+                <a16:creationId xmlns:a16="http://schemas.microsoft.com/office/drawing/2014/main" xmlns="" id="{3571319E-0245-41BE-8876-5FABD16D418A}"/>
               </a:ext>
             </a:extLst>
           </p:cNvPr>
@@ -6127,7 +6221,7 @@
           <p:cNvPr id="10" name="Rectangle 9">
             <a:extLst>
               <a:ext uri="{FF2B5EF4-FFF2-40B4-BE49-F238E27FC236}">
-                <a16:creationId xmlns:a16="http://schemas.microsoft.com/office/drawing/2014/main" id="{BDA7E833-58F7-4817-BFD3-C7E1CEE226E0}"/>
+                <a16:creationId xmlns:a16="http://schemas.microsoft.com/office/drawing/2014/main" xmlns="" id="{BDA7E833-58F7-4817-BFD3-C7E1CEE226E0}"/>
               </a:ext>
             </a:extLst>
           </p:cNvPr>
@@ -6188,7 +6282,7 @@
           <p:cNvPr id="11" name="Rectangle 10">
             <a:extLst>
               <a:ext uri="{FF2B5EF4-FFF2-40B4-BE49-F238E27FC236}">
-                <a16:creationId xmlns:a16="http://schemas.microsoft.com/office/drawing/2014/main" id="{C9CA1647-3DDD-4CC3-B8D9-7A87A7428C66}"/>
+                <a16:creationId xmlns:a16="http://schemas.microsoft.com/office/drawing/2014/main" xmlns="" id="{C9CA1647-3DDD-4CC3-B8D9-7A87A7428C66}"/>
               </a:ext>
             </a:extLst>
           </p:cNvPr>
@@ -6266,7 +6360,7 @@
           <p:cNvPr id="4" name="Rectangle 1">
             <a:extLst>
               <a:ext uri="{FF2B5EF4-FFF2-40B4-BE49-F238E27FC236}">
-                <a16:creationId xmlns:a16="http://schemas.microsoft.com/office/drawing/2014/main" id="{87971CC0-BE01-4493-B3BE-0A513ABA81B4}"/>
+                <a16:creationId xmlns:a16="http://schemas.microsoft.com/office/drawing/2014/main" xmlns="" id="{87971CC0-BE01-4493-B3BE-0A513ABA81B4}"/>
               </a:ext>
             </a:extLst>
           </p:cNvPr>
@@ -6372,7 +6466,7 @@
           <p:cNvPr id="5" name="Rectangle 2">
             <a:extLst>
               <a:ext uri="{FF2B5EF4-FFF2-40B4-BE49-F238E27FC236}">
-                <a16:creationId xmlns:a16="http://schemas.microsoft.com/office/drawing/2014/main" id="{B616FD1F-6FA7-49E3-8FB1-DC34DA1480E0}"/>
+                <a16:creationId xmlns:a16="http://schemas.microsoft.com/office/drawing/2014/main" xmlns="" id="{B616FD1F-6FA7-49E3-8FB1-DC34DA1480E0}"/>
               </a:ext>
             </a:extLst>
           </p:cNvPr>
@@ -6520,7 +6614,7 @@
           <p:cNvPr id="6" name="Rectangle 5">
             <a:extLst>
               <a:ext uri="{FF2B5EF4-FFF2-40B4-BE49-F238E27FC236}">
-                <a16:creationId xmlns:a16="http://schemas.microsoft.com/office/drawing/2014/main" id="{90578871-9E2F-4A40-AED0-1034016AE235}"/>
+                <a16:creationId xmlns:a16="http://schemas.microsoft.com/office/drawing/2014/main" xmlns="" id="{90578871-9E2F-4A40-AED0-1034016AE235}"/>
               </a:ext>
             </a:extLst>
           </p:cNvPr>
@@ -6596,7 +6690,7 @@
           <p:cNvPr id="7" name="Rectangle 6">
             <a:extLst>
               <a:ext uri="{FF2B5EF4-FFF2-40B4-BE49-F238E27FC236}">
-                <a16:creationId xmlns:a16="http://schemas.microsoft.com/office/drawing/2014/main" id="{506B548F-CD4A-43C7-BA8E-347F7645BE98}"/>
+                <a16:creationId xmlns:a16="http://schemas.microsoft.com/office/drawing/2014/main" xmlns="" id="{506B548F-CD4A-43C7-BA8E-347F7645BE98}"/>
               </a:ext>
             </a:extLst>
           </p:cNvPr>
@@ -6663,7 +6757,7 @@
           <p:cNvPr id="8" name="Rectangle 7">
             <a:extLst>
               <a:ext uri="{FF2B5EF4-FFF2-40B4-BE49-F238E27FC236}">
-                <a16:creationId xmlns:a16="http://schemas.microsoft.com/office/drawing/2014/main" id="{D17634E2-92B3-4B3A-A261-3F88419ED5A4}"/>
+                <a16:creationId xmlns:a16="http://schemas.microsoft.com/office/drawing/2014/main" xmlns="" id="{D17634E2-92B3-4B3A-A261-3F88419ED5A4}"/>
               </a:ext>
             </a:extLst>
           </p:cNvPr>
@@ -6741,7 +6835,7 @@
           <p:cNvPr id="4" name="Rectangle 3">
             <a:extLst>
               <a:ext uri="{FF2B5EF4-FFF2-40B4-BE49-F238E27FC236}">
-                <a16:creationId xmlns:a16="http://schemas.microsoft.com/office/drawing/2014/main" id="{0F99765E-6D6F-4C05-ACB4-2519515EAD41}"/>
+                <a16:creationId xmlns:a16="http://schemas.microsoft.com/office/drawing/2014/main" xmlns="" id="{0F99765E-6D6F-4C05-ACB4-2519515EAD41}"/>
               </a:ext>
             </a:extLst>
           </p:cNvPr>
@@ -6817,7 +6911,7 @@
           <p:cNvPr id="5" name="Rectangle 4">
             <a:extLst>
               <a:ext uri="{FF2B5EF4-FFF2-40B4-BE49-F238E27FC236}">
-                <a16:creationId xmlns:a16="http://schemas.microsoft.com/office/drawing/2014/main" id="{6BD848BB-C7EA-4D85-804C-611B7B1BE0EF}"/>
+                <a16:creationId xmlns:a16="http://schemas.microsoft.com/office/drawing/2014/main" xmlns="" id="{6BD848BB-C7EA-4D85-804C-611B7B1BE0EF}"/>
               </a:ext>
             </a:extLst>
           </p:cNvPr>
@@ -6884,7 +6978,7 @@
           <p:cNvPr id="6" name="Rectangle 5">
             <a:extLst>
               <a:ext uri="{FF2B5EF4-FFF2-40B4-BE49-F238E27FC236}">
-                <a16:creationId xmlns:a16="http://schemas.microsoft.com/office/drawing/2014/main" id="{125B924C-D6B5-4490-A932-7DEF4A47AD2C}"/>
+                <a16:creationId xmlns:a16="http://schemas.microsoft.com/office/drawing/2014/main" xmlns="" id="{125B924C-D6B5-4490-A932-7DEF4A47AD2C}"/>
               </a:ext>
             </a:extLst>
           </p:cNvPr>
@@ -6945,7 +7039,7 @@
           <p:cNvPr id="7" name="Rectangle 6">
             <a:extLst>
               <a:ext uri="{FF2B5EF4-FFF2-40B4-BE49-F238E27FC236}">
-                <a16:creationId xmlns:a16="http://schemas.microsoft.com/office/drawing/2014/main" id="{849DCDD2-8D45-4C0B-BC3C-F674B8846F02}"/>
+                <a16:creationId xmlns:a16="http://schemas.microsoft.com/office/drawing/2014/main" xmlns="" id="{849DCDD2-8D45-4C0B-BC3C-F674B8846F02}"/>
               </a:ext>
             </a:extLst>
           </p:cNvPr>
@@ -7042,7 +7136,7 @@
           <p:cNvPr id="9" name="Rectangle 8">
             <a:extLst>
               <a:ext uri="{FF2B5EF4-FFF2-40B4-BE49-F238E27FC236}">
-                <a16:creationId xmlns:a16="http://schemas.microsoft.com/office/drawing/2014/main" id="{38FAA4FC-0055-4D56-9B9D-4AECBD09FADD}"/>
+                <a16:creationId xmlns:a16="http://schemas.microsoft.com/office/drawing/2014/main" xmlns="" id="{38FAA4FC-0055-4D56-9B9D-4AECBD09FADD}"/>
               </a:ext>
             </a:extLst>
           </p:cNvPr>
@@ -7103,7 +7197,7 @@
           <p:cNvPr id="10" name="Rectangle 9">
             <a:extLst>
               <a:ext uri="{FF2B5EF4-FFF2-40B4-BE49-F238E27FC236}">
-                <a16:creationId xmlns:a16="http://schemas.microsoft.com/office/drawing/2014/main" id="{C2CDCFFD-0B9E-485B-9401-346FB7CC22B9}"/>
+                <a16:creationId xmlns:a16="http://schemas.microsoft.com/office/drawing/2014/main" xmlns="" id="{C2CDCFFD-0B9E-485B-9401-346FB7CC22B9}"/>
               </a:ext>
             </a:extLst>
           </p:cNvPr>
@@ -7163,7 +7257,7 @@
           <p:cNvPr id="11" name="TextBox 10">
             <a:extLst>
               <a:ext uri="{FF2B5EF4-FFF2-40B4-BE49-F238E27FC236}">
-                <a16:creationId xmlns:a16="http://schemas.microsoft.com/office/drawing/2014/main" id="{495F6BF4-1C5B-4A0B-BF3B-38F332483198}"/>
+                <a16:creationId xmlns:a16="http://schemas.microsoft.com/office/drawing/2014/main" xmlns="" id="{495F6BF4-1C5B-4A0B-BF3B-38F332483198}"/>
               </a:ext>
             </a:extLst>
           </p:cNvPr>
@@ -7232,7 +7326,7 @@
           <p:cNvPr id="8" name="Rectangle 7">
             <a:extLst>
               <a:ext uri="{FF2B5EF4-FFF2-40B4-BE49-F238E27FC236}">
-                <a16:creationId xmlns:a16="http://schemas.microsoft.com/office/drawing/2014/main" id="{5106027A-D091-49A3-8E8E-47FB5E3BDFBD}"/>
+                <a16:creationId xmlns:a16="http://schemas.microsoft.com/office/drawing/2014/main" xmlns="" id="{5106027A-D091-49A3-8E8E-47FB5E3BDFBD}"/>
               </a:ext>
             </a:extLst>
           </p:cNvPr>
@@ -7280,7 +7374,7 @@
           <p:cNvPr id="9" name="TextBox 8">
             <a:extLst>
               <a:ext uri="{FF2B5EF4-FFF2-40B4-BE49-F238E27FC236}">
-                <a16:creationId xmlns:a16="http://schemas.microsoft.com/office/drawing/2014/main" id="{F6EE9838-4C82-43C4-B08E-AB66B8DFAE23}"/>
+                <a16:creationId xmlns:a16="http://schemas.microsoft.com/office/drawing/2014/main" xmlns="" id="{F6EE9838-4C82-43C4-B08E-AB66B8DFAE23}"/>
               </a:ext>
             </a:extLst>
           </p:cNvPr>

</xml_diff>